<commit_message>
update and formatting edits
</commit_message>
<xml_diff>
--- a/corridor_docs/eric_ms_thesis/images/figures.pptx
+++ b/corridor_docs/eric_ms_thesis/images/figures.pptx
@@ -5095,6 +5095,9 @@
           <a:prstGeom prst="rect">
             <a:avLst/>
           </a:prstGeom>
+          <a:solidFill>
+            <a:srgbClr val="002060"/>
+          </a:solidFill>
         </p:spPr>
         <p:style>
           <a:lnRef idx="2">
@@ -5145,6 +5148,9 @@
             <a:avLst/>
           </a:prstGeom>
           <a:ln w="28575">
+            <a:solidFill>
+              <a:srgbClr val="002060"/>
+            </a:solidFill>
             <a:tailEnd type="triangle"/>
           </a:ln>
         </p:spPr>
@@ -5187,6 +5193,9 @@
             <a:avLst/>
           </a:prstGeom>
           <a:ln w="28575">
+            <a:solidFill>
+              <a:srgbClr val="002060"/>
+            </a:solidFill>
             <a:tailEnd type="triangle"/>
           </a:ln>
         </p:spPr>
@@ -5305,6 +5314,11 @@
           <a:prstGeom prst="rect">
             <a:avLst/>
           </a:prstGeom>
+          <a:solidFill>
+            <a:schemeClr val="bg1">
+              <a:lumMod val="85000"/>
+            </a:schemeClr>
+          </a:solidFill>
         </p:spPr>
         <p:style>
           <a:lnRef idx="2">
@@ -5351,7 +5365,9 @@
           <a:prstGeom prst="rect">
             <a:avLst/>
           </a:prstGeom>
-          <a:noFill/>
+          <a:solidFill>
+            <a:srgbClr val="002060"/>
+          </a:solidFill>
         </p:spPr>
         <p:style>
           <a:lnRef idx="2">
@@ -5398,7 +5414,9 @@
           <a:prstGeom prst="rect">
             <a:avLst/>
           </a:prstGeom>
-          <a:noFill/>
+          <a:solidFill>
+            <a:srgbClr val="002060"/>
+          </a:solidFill>
         </p:spPr>
         <p:style>
           <a:lnRef idx="2">
@@ -5445,7 +5463,9 @@
           <a:prstGeom prst="rect">
             <a:avLst/>
           </a:prstGeom>
-          <a:noFill/>
+          <a:solidFill>
+            <a:srgbClr val="002060"/>
+          </a:solidFill>
         </p:spPr>
         <p:style>
           <a:lnRef idx="2">
@@ -5492,6 +5512,11 @@
           <a:prstGeom prst="rect">
             <a:avLst/>
           </a:prstGeom>
+          <a:solidFill>
+            <a:schemeClr val="bg1">
+              <a:lumMod val="85000"/>
+            </a:schemeClr>
+          </a:solidFill>
         </p:spPr>
         <p:style>
           <a:lnRef idx="2">
@@ -5538,6 +5563,11 @@
           <a:prstGeom prst="rect">
             <a:avLst/>
           </a:prstGeom>
+          <a:solidFill>
+            <a:schemeClr val="bg1">
+              <a:lumMod val="85000"/>
+            </a:schemeClr>
+          </a:solidFill>
         </p:spPr>
         <p:style>
           <a:lnRef idx="2">
@@ -5584,7 +5614,9 @@
           <a:prstGeom prst="rect">
             <a:avLst/>
           </a:prstGeom>
-          <a:noFill/>
+          <a:solidFill>
+            <a:srgbClr val="002060"/>
+          </a:solidFill>
         </p:spPr>
         <p:style>
           <a:lnRef idx="2">
@@ -5625,8 +5657,8 @@
         </p:nvSpPr>
         <p:spPr>
           <a:xfrm>
-            <a:off x="1683792" y="3392888"/>
-            <a:ext cx="1056894" cy="338554"/>
+            <a:off x="1500912" y="3139669"/>
+            <a:ext cx="1056894" cy="369332"/>
           </a:xfrm>
           <a:prstGeom prst="rect">
             <a:avLst/>
@@ -5640,7 +5672,7 @@
           <a:lstStyle/>
           <a:p>
             <a:r>
-              <a:rPr lang="en-US" sz="1600" dirty="0"/>
+              <a:rPr lang="en-US" dirty="0"/>
               <a:t>8</a:t>
             </a:r>
           </a:p>
@@ -5660,8 +5692,8 @@
         </p:nvSpPr>
         <p:spPr>
           <a:xfrm>
-            <a:off x="2478588" y="3566067"/>
-            <a:ext cx="757056" cy="338554"/>
+            <a:off x="2169099" y="3326916"/>
+            <a:ext cx="757056" cy="369332"/>
           </a:xfrm>
           <a:prstGeom prst="rect">
             <a:avLst/>
@@ -5675,7 +5707,7 @@
           <a:lstStyle/>
           <a:p>
             <a:r>
-              <a:rPr lang="en-US" sz="1600" dirty="0"/>
+              <a:rPr lang="en-US" dirty="0"/>
               <a:t>53N</a:t>
             </a:r>
           </a:p>
@@ -5695,8 +5727,8 @@
         </p:nvSpPr>
         <p:spPr>
           <a:xfrm>
-            <a:off x="2270933" y="3935433"/>
-            <a:ext cx="757056" cy="338554"/>
+            <a:off x="1792630" y="3907298"/>
+            <a:ext cx="757056" cy="369332"/>
           </a:xfrm>
           <a:prstGeom prst="rect">
             <a:avLst/>
@@ -5710,7 +5742,7 @@
           <a:lstStyle/>
           <a:p>
             <a:r>
-              <a:rPr lang="en-US" sz="1600" dirty="0"/>
+              <a:rPr lang="en-US" dirty="0"/>
               <a:t>52</a:t>
             </a:r>
           </a:p>
@@ -5730,8 +5762,8 @@
         </p:nvSpPr>
         <p:spPr>
           <a:xfrm>
-            <a:off x="2966774" y="4439971"/>
-            <a:ext cx="757056" cy="338554"/>
+            <a:off x="2460337" y="4425903"/>
+            <a:ext cx="757056" cy="369332"/>
           </a:xfrm>
           <a:prstGeom prst="rect">
             <a:avLst/>
@@ -5745,12 +5777,90 @@
           <a:lstStyle/>
           <a:p>
             <a:r>
-              <a:rPr lang="en-US" sz="1600" dirty="0"/>
+              <a:rPr lang="en-US" dirty="0"/>
               <a:t>54</a:t>
             </a:r>
           </a:p>
         </p:txBody>
       </p:sp>
+      <p:pic>
+        <p:nvPicPr>
+          <p:cNvPr id="2" name="Picture 2" descr="Map of Savannah River Site (SRS) located in South Carolina ...">
+            <a:extLst>
+              <a:ext uri="{FF2B5EF4-FFF2-40B4-BE49-F238E27FC236}">
+                <a16:creationId xmlns:a16="http://schemas.microsoft.com/office/drawing/2014/main" id="{8CD9DBE9-03B9-82B4-6FCD-F46F91922FA1}"/>
+              </a:ext>
+            </a:extLst>
+          </p:cNvPr>
+          <p:cNvPicPr>
+            <a:picLocks noChangeAspect="1" noChangeArrowheads="1"/>
+          </p:cNvPicPr>
+          <p:nvPr/>
+        </p:nvPicPr>
+        <p:blipFill rotWithShape="1">
+          <a:blip r:embed="rId5">
+            <a:alphaModFix/>
+            <a:extLst>
+              <a:ext uri="{28A0092B-C50C-407E-A947-70E740481C1C}">
+                <a14:useLocalDpi xmlns:a14="http://schemas.microsoft.com/office/drawing/2010/main" val="0"/>
+              </a:ext>
+            </a:extLst>
+          </a:blip>
+          <a:srcRect l="44972" t="85663" r="3606" b="988"/>
+          <a:stretch>
+            <a:fillRect/>
+          </a:stretch>
+        </p:blipFill>
+        <p:spPr bwMode="auto">
+          <a:xfrm>
+            <a:off x="1044674" y="6673260"/>
+            <a:ext cx="1949664" cy="662150"/>
+          </a:xfrm>
+          <a:prstGeom prst="rect">
+            <a:avLst/>
+          </a:prstGeom>
+          <a:noFill/>
+          <a:extLst>
+            <a:ext uri="{909E8E84-426E-40DD-AFC4-6F175D3DCCD1}">
+              <a14:hiddenFill xmlns:a14="http://schemas.microsoft.com/office/drawing/2010/main">
+                <a:solidFill>
+                  <a:srgbClr val="FFFFFF"/>
+                </a:solidFill>
+              </a14:hiddenFill>
+            </a:ext>
+          </a:extLst>
+        </p:spPr>
+      </p:pic>
+      <p:pic>
+        <p:nvPicPr>
+          <p:cNvPr id="6" name="Picture 5">
+            <a:extLst>
+              <a:ext uri="{FF2B5EF4-FFF2-40B4-BE49-F238E27FC236}">
+                <a16:creationId xmlns:a16="http://schemas.microsoft.com/office/drawing/2014/main" id="{5E142282-E276-71AB-0315-8E64F89BA987}"/>
+              </a:ext>
+            </a:extLst>
+          </p:cNvPr>
+          <p:cNvPicPr>
+            <a:picLocks noChangeAspect="1"/>
+          </p:cNvPicPr>
+          <p:nvPr/>
+        </p:nvPicPr>
+        <p:blipFill>
+          <a:blip r:embed="rId6"/>
+          <a:stretch>
+            <a:fillRect/>
+          </a:stretch>
+        </p:blipFill>
+        <p:spPr>
+          <a:xfrm>
+            <a:off x="519179" y="6770665"/>
+            <a:ext cx="356585" cy="578701"/>
+          </a:xfrm>
+          <a:prstGeom prst="rect">
+            <a:avLst/>
+          </a:prstGeom>
+        </p:spPr>
+      </p:pic>
     </p:spTree>
     <p:extLst>
       <p:ext uri="{BB962C8B-B14F-4D97-AF65-F5344CB8AC3E}">

</xml_diff>